<commit_message>
Correcting typo on Slide 3
</commit_message>
<xml_diff>
--- a/Background3.pptx
+++ b/Background3.pptx
@@ -241,7 +241,7 @@
             <a:fld id="{F6490402-8E07-BB4F-A189-6AD7200B2129}" type="datetime1">
               <a:rPr lang="en-US" smtClean="0"/>
               <a:pPr/>
-              <a:t>3/22/21</a:t>
+              <a:t>8/31/22</a:t>
             </a:fld>
             <a:endParaRPr lang="sv-SE"/>
           </a:p>
@@ -409,7 +409,7 @@
             <a:fld id="{69A8E3D5-343E-3741-80FE-788E6CEB802F}" type="datetime1">
               <a:rPr lang="en-US" smtClean="0"/>
               <a:pPr/>
-              <a:t>3/22/21</a:t>
+              <a:t>8/31/22</a:t>
             </a:fld>
             <a:endParaRPr lang="sv-SE"/>
           </a:p>
@@ -11200,8 +11200,8 @@
           </a:p>
         </p:txBody>
       </p:sp>
-      <mc:AlternateContent xmlns:mc="http://schemas.openxmlformats.org/markup-compatibility/2006">
-        <mc:Choice xmlns:a14="http://schemas.microsoft.com/office/drawing/2010/main" Requires="a14">
+      <mc:AlternateContent xmlns:mc="http://schemas.openxmlformats.org/markup-compatibility/2006" xmlns:a14="http://schemas.microsoft.com/office/drawing/2010/main">
+        <mc:Choice Requires="a14">
           <p:sp>
             <p:nvSpPr>
               <p:cNvPr id="3" name="Text Placeholder 2">
@@ -11391,7 +11391,7 @@
             </p:txBody>
           </p:sp>
         </mc:Choice>
-        <mc:Fallback>
+        <mc:Fallback xmlns="">
           <p:sp>
             <p:nvSpPr>
               <p:cNvPr id="3" name="Text Placeholder 2">
@@ -11520,8 +11520,8 @@
           </a:prstGeom>
         </p:spPr>
       </p:pic>
-      <mc:AlternateContent xmlns:mc="http://schemas.openxmlformats.org/markup-compatibility/2006">
-        <mc:Choice xmlns:a14="http://schemas.microsoft.com/office/drawing/2010/main" Requires="a14">
+      <mc:AlternateContent xmlns:mc="http://schemas.openxmlformats.org/markup-compatibility/2006" xmlns:a14="http://schemas.microsoft.com/office/drawing/2010/main">
+        <mc:Choice Requires="a14">
           <p:sp>
             <p:nvSpPr>
               <p:cNvPr id="8" name="Rectangle 7">
@@ -11613,7 +11613,7 @@
             </p:txBody>
           </p:sp>
         </mc:Choice>
-        <mc:Fallback>
+        <mc:Fallback xmlns="">
           <p:sp>
             <p:nvSpPr>
               <p:cNvPr id="8" name="Rectangle 7">
@@ -12785,8 +12785,8 @@
           </p:sp>
         </mc:Fallback>
       </mc:AlternateContent>
-      <mc:AlternateContent xmlns:mc="http://schemas.openxmlformats.org/markup-compatibility/2006" xmlns:a14="http://schemas.microsoft.com/office/drawing/2010/main">
-        <mc:Choice Requires="a14">
+      <mc:AlternateContent xmlns:mc="http://schemas.openxmlformats.org/markup-compatibility/2006">
+        <mc:Choice xmlns:a14="http://schemas.microsoft.com/office/drawing/2010/main" Requires="a14">
           <p:sp>
             <p:nvSpPr>
               <p:cNvPr id="12" name="TextBox 11">
@@ -12967,6 +12967,15 @@
                         </m:naryPr>
                         <m:sub>
                           <m:r>
+                            <a:rPr lang="sv-SE" b="0" i="1" dirty="0" smtClean="0">
+                              <a:solidFill>
+                                <a:schemeClr val="tx1"/>
+                              </a:solidFill>
+                              <a:latin typeface="Cambria Math" panose="02040503050406030204" pitchFamily="18" charset="0"/>
+                            </a:rPr>
+                            <m:t>−</m:t>
+                          </m:r>
+                          <m:r>
                             <m:rPr>
                               <m:brk m:alnAt="23"/>
                             </m:rPr>
@@ -12981,15 +12990,6 @@
                           </m:r>
                         </m:sub>
                         <m:sup>
-                          <m:r>
-                            <a:rPr lang="sv-SE" b="0" i="1" dirty="0" smtClean="0">
-                              <a:solidFill>
-                                <a:schemeClr val="tx1"/>
-                              </a:solidFill>
-                              <a:latin typeface="Cambria Math" panose="02040503050406030204" pitchFamily="18" charset="0"/>
-                            </a:rPr>
-                            <m:t>−</m:t>
-                          </m:r>
                           <m:r>
                             <a:rPr lang="sv-SE" b="0" i="1" dirty="0" smtClean="0">
                               <a:solidFill>
@@ -13157,7 +13157,7 @@
             </p:txBody>
           </p:sp>
         </mc:Choice>
-        <mc:Fallback xmlns="">
+        <mc:Fallback>
           <p:sp>
             <p:nvSpPr>
               <p:cNvPr id="12" name="TextBox 11">
@@ -34008,20 +34008,20 @@
 </file>
 
 <file path=customXml/item1.xml><?xml version="1.0" encoding="utf-8"?>
+<p:properties xmlns:p="http://schemas.microsoft.com/office/2006/metadata/properties" xmlns:xsi="http://www.w3.org/2001/XMLSchema-instance" xmlns:pc="http://schemas.microsoft.com/office/infopath/2007/PartnerControls">
+  <documentManagement>
+    <Notes xmlns="a5aea428-1722-47f0-acbf-e195f738e188" xsi:nil="true"/>
+  </documentManagement>
+</p:properties>
+</file>
+
+<file path=customXml/item2.xml><?xml version="1.0" encoding="utf-8"?>
 <?mso-contentType ?>
 <FormTemplates xmlns="http://schemas.microsoft.com/sharepoint/v3/contenttype/forms">
   <Display>DocumentLibraryForm</Display>
   <Edit>DocumentLibraryForm</Edit>
   <New>DocumentLibraryForm</New>
 </FormTemplates>
-</file>
-
-<file path=customXml/item2.xml><?xml version="1.0" encoding="utf-8"?>
-<p:properties xmlns:p="http://schemas.microsoft.com/office/2006/metadata/properties" xmlns:xsi="http://www.w3.org/2001/XMLSchema-instance" xmlns:pc="http://schemas.microsoft.com/office/infopath/2007/PartnerControls">
-  <documentManagement>
-    <Notes xmlns="a5aea428-1722-47f0-acbf-e195f738e188" xsi:nil="true"/>
-  </documentManagement>
-</p:properties>
 </file>
 
 <file path=customXml/item3.xml><?xml version="1.0" encoding="utf-8"?>
@@ -34185,19 +34185,19 @@
 </file>
 
 <file path=customXml/itemProps1.xml><?xml version="1.0" encoding="utf-8"?>
-<ds:datastoreItem xmlns:ds="http://schemas.openxmlformats.org/officeDocument/2006/customXml" ds:itemID="{DF319BF0-57E1-4878-B48D-94EA12B11E60}">
+<ds:datastoreItem xmlns:ds="http://schemas.openxmlformats.org/officeDocument/2006/customXml" ds:itemID="{3CFE17CC-CFFB-40D4-8FF9-C25CBCDADBD5}">
   <ds:schemaRefs>
-    <ds:schemaRef ds:uri="http://schemas.microsoft.com/sharepoint/v3/contenttype/forms"/>
+    <ds:schemaRef ds:uri="http://schemas.microsoft.com/office/2006/metadata/properties"/>
+    <ds:schemaRef ds:uri="http://schemas.microsoft.com/office/infopath/2007/PartnerControls"/>
+    <ds:schemaRef ds:uri="a5aea428-1722-47f0-acbf-e195f738e188"/>
   </ds:schemaRefs>
 </ds:datastoreItem>
 </file>
 
 <file path=customXml/itemProps2.xml><?xml version="1.0" encoding="utf-8"?>
-<ds:datastoreItem xmlns:ds="http://schemas.openxmlformats.org/officeDocument/2006/customXml" ds:itemID="{3CFE17CC-CFFB-40D4-8FF9-C25CBCDADBD5}">
+<ds:datastoreItem xmlns:ds="http://schemas.openxmlformats.org/officeDocument/2006/customXml" ds:itemID="{DF319BF0-57E1-4878-B48D-94EA12B11E60}">
   <ds:schemaRefs>
-    <ds:schemaRef ds:uri="http://schemas.microsoft.com/office/2006/metadata/properties"/>
-    <ds:schemaRef ds:uri="http://schemas.microsoft.com/office/infopath/2007/PartnerControls"/>
-    <ds:schemaRef ds:uri="a5aea428-1722-47f0-acbf-e195f738e188"/>
+    <ds:schemaRef ds:uri="http://schemas.microsoft.com/sharepoint/v3/contenttype/forms"/>
   </ds:schemaRefs>
 </ds:datastoreItem>
 </file>

</xml_diff>